<commit_message>
Artefato 15 correção 02
</commit_message>
<xml_diff>
--- a/artefatos/15-Arquitetura de Negócio para cada Cenário.pptx
+++ b/artefatos/15-Arquitetura de Negócio para cada Cenário.pptx
@@ -3000,12 +3000,9 @@
             <a:pPr algn="ctr"/>
             <a:r>
               <a:rPr lang="pt-BR" dirty="0" smtClean="0"/>
-              <a:t>Loja/</a:t>
-            </a:r>
-            <a:r>
-              <a:rPr lang="pt-BR" dirty="0"/>
-              <a:t>Franquia</a:t>
-            </a:r>
+              <a:t>Cliente</a:t>
+            </a:r>
+            <a:endParaRPr lang="pt-BR" dirty="0"/>
           </a:p>
         </p:txBody>
       </p:sp>
@@ -3033,15 +3030,7 @@
           <a:p>
             <a:r>
               <a:rPr lang="pt-BR" dirty="0" smtClean="0"/>
-              <a:t>1 </a:t>
-            </a:r>
-            <a:r>
-              <a:rPr lang="pt-BR" dirty="0" smtClean="0"/>
-              <a:t>- </a:t>
-            </a:r>
-            <a:r>
-              <a:rPr lang="pt-BR" dirty="0" smtClean="0"/>
-              <a:t>Realizar o cadastro. </a:t>
+              <a:t>1 - Realizar o cadastro. </a:t>
             </a:r>
           </a:p>
           <a:p>
@@ -3079,15 +3068,7 @@
             </a:r>
             <a:r>
               <a:rPr lang="pt-BR" dirty="0" smtClean="0"/>
-              <a:t> - </a:t>
-            </a:r>
-            <a:r>
-              <a:rPr lang="pt-BR" dirty="0" smtClean="0"/>
-              <a:t>Receber </a:t>
-            </a:r>
-            <a:r>
-              <a:rPr lang="pt-BR" dirty="0" smtClean="0"/>
-              <a:t>o pedido.</a:t>
+              <a:t> - Receber o pedido.</a:t>
             </a:r>
           </a:p>
           <a:p>
@@ -3377,11 +3358,7 @@
             </a:r>
             <a:r>
               <a:rPr lang="pt-BR" dirty="0" smtClean="0"/>
-              <a:t> </a:t>
-            </a:r>
-            <a:r>
-              <a:rPr lang="pt-BR" dirty="0" smtClean="0"/>
-              <a:t>- Cadastrar </a:t>
+              <a:t> - Cadastrar </a:t>
             </a:r>
             <a:r>
               <a:rPr lang="pt-BR" dirty="0"/>
@@ -3391,7 +3368,6 @@
               <a:rPr lang="pt-BR" dirty="0" smtClean="0"/>
               <a:t>fornecedor. </a:t>
             </a:r>
-            <a:endParaRPr lang="pt-BR" dirty="0" smtClean="0"/>
           </a:p>
           <a:p>
             <a:r>
@@ -3400,11 +3376,7 @@
             </a:r>
             <a:r>
               <a:rPr lang="pt-BR" dirty="0" smtClean="0"/>
-              <a:t> </a:t>
-            </a:r>
-            <a:r>
-              <a:rPr lang="pt-BR" dirty="0" smtClean="0"/>
-              <a:t>- Fornecer orçamento.</a:t>
+              <a:t> - Fornecer orçamento.</a:t>
             </a:r>
           </a:p>
           <a:p>
@@ -3414,29 +3386,13 @@
             </a:r>
             <a:r>
               <a:rPr lang="pt-BR" dirty="0" smtClean="0"/>
-              <a:t> </a:t>
-            </a:r>
+              <a:t> - Vender matérias-primas.</a:t>
+            </a:r>
+          </a:p>
+          <a:p>
             <a:r>
               <a:rPr lang="pt-BR" dirty="0" smtClean="0"/>
-              <a:t>- Vender matérias-primas.</a:t>
-            </a:r>
-          </a:p>
-          <a:p>
-            <a:r>
-              <a:rPr lang="pt-BR" dirty="0" smtClean="0"/>
-              <a:t>10</a:t>
-            </a:r>
-            <a:r>
-              <a:rPr lang="pt-BR" dirty="0" smtClean="0"/>
-              <a:t> </a:t>
-            </a:r>
-            <a:r>
-              <a:rPr lang="pt-BR" dirty="0" smtClean="0"/>
-              <a:t>- Entregar </a:t>
-            </a:r>
-            <a:r>
-              <a:rPr lang="pt-BR" dirty="0" smtClean="0"/>
-              <a:t>matérias-primas.</a:t>
+              <a:t>10 - Entregar matérias-primas.</a:t>
             </a:r>
             <a:endParaRPr lang="pt-BR" dirty="0"/>
           </a:p>
@@ -3449,11 +3405,7 @@
           <a:p>
             <a:r>
               <a:rPr lang="pt-BR" dirty="0" smtClean="0"/>
-              <a:t>12</a:t>
-            </a:r>
-            <a:r>
-              <a:rPr lang="pt-BR" dirty="0" smtClean="0"/>
-              <a:t> - Devolução compra.</a:t>
+              <a:t>12 - Devolução compra.</a:t>
             </a:r>
           </a:p>
         </p:txBody>
@@ -3638,7 +3590,7 @@
           <p:cNvPr id="11" name="Retângulo de cantos arredondados 10">
             <a:extLst>
               <a:ext uri="{FF2B5EF4-FFF2-40B4-BE49-F238E27FC236}">
-                <a16:creationId xmlns:lc="http://schemas.openxmlformats.org/drawingml/2006/lockedCanvas" xmlns:a16="http://schemas.microsoft.com/office/drawing/2014/main" xmlns="" id="{67FC9C97-6BBA-4BFC-A5E1-2436DE02BBE2}"/>
+                <a16:creationId xmlns="" xmlns:a16="http://schemas.microsoft.com/office/drawing/2014/main" xmlns:lc="http://schemas.openxmlformats.org/drawingml/2006/lockedCanvas" id="{67FC9C97-6BBA-4BFC-A5E1-2436DE02BBE2}"/>
               </a:ext>
             </a:extLst>
           </p:cNvPr>
@@ -3800,11 +3752,7 @@
             </a:r>
             <a:r>
               <a:rPr lang="pt-BR" b="1" dirty="0" smtClean="0"/>
-              <a:t>a compra da matéria-prima</a:t>
-            </a:r>
-            <a:r>
-              <a:rPr lang="pt-BR" b="1" dirty="0" smtClean="0"/>
-              <a:t>.</a:t>
+              <a:t>a compra da matéria-prima.</a:t>
             </a:r>
             <a:endParaRPr lang="pt-BR" dirty="0"/>
           </a:p>
@@ -4174,7 +4122,7 @@
           <p:cNvPr id="11" name="Retângulo de cantos arredondados 10">
             <a:extLst>
               <a:ext uri="{FF2B5EF4-FFF2-40B4-BE49-F238E27FC236}">
-                <a16:creationId xmlns:lc="http://schemas.openxmlformats.org/drawingml/2006/lockedCanvas" xmlns:a16="http://schemas.microsoft.com/office/drawing/2014/main" xmlns="" id="{67FC9C97-6BBA-4BFC-A5E1-2436DE02BBE2}"/>
+                <a16:creationId xmlns="" xmlns:a16="http://schemas.microsoft.com/office/drawing/2014/main" xmlns:lc="http://schemas.openxmlformats.org/drawingml/2006/lockedCanvas" id="{67FC9C97-6BBA-4BFC-A5E1-2436DE02BBE2}"/>
               </a:ext>
             </a:extLst>
           </p:cNvPr>
@@ -4376,13 +4324,8 @@
           <a:p>
             <a:r>
               <a:rPr lang="pt-BR" dirty="0"/>
-              <a:t>Cenário</a:t>
-            </a:r>
-            <a:r>
-              <a:rPr lang="pt-BR" dirty="0"/>
-              <a:t>: Entregar matérias-primas</a:t>
-            </a:r>
-            <a:endParaRPr lang="pt-BR" dirty="0"/>
+              <a:t>Cenário: Entregar matérias-primas</a:t>
+            </a:r>
           </a:p>
         </p:txBody>
       </p:sp>
@@ -4706,7 +4649,7 @@
           <p:cNvPr id="11" name="Retângulo de cantos arredondados 10">
             <a:extLst>
               <a:ext uri="{FF2B5EF4-FFF2-40B4-BE49-F238E27FC236}">
-                <a16:creationId xmlns:lc="http://schemas.openxmlformats.org/drawingml/2006/lockedCanvas" xmlns:a16="http://schemas.microsoft.com/office/drawing/2014/main" xmlns="" id="{67FC9C97-6BBA-4BFC-A5E1-2436DE02BBE2}"/>
+                <a16:creationId xmlns="" xmlns:a16="http://schemas.microsoft.com/office/drawing/2014/main" xmlns:lc="http://schemas.openxmlformats.org/drawingml/2006/lockedCanvas" id="{67FC9C97-6BBA-4BFC-A5E1-2436DE02BBE2}"/>
               </a:ext>
             </a:extLst>
           </p:cNvPr>
@@ -4864,11 +4807,7 @@
             <a:pPr algn="ctr"/>
             <a:r>
               <a:rPr lang="pt-BR" b="1" dirty="0" smtClean="0"/>
-              <a:t>Tratar</a:t>
-            </a:r>
-            <a:r>
-              <a:rPr lang="pt-BR" b="1" dirty="0" smtClean="0"/>
-              <a:t> cancelamento da compra.</a:t>
+              <a:t>Tratar cancelamento da compra.</a:t>
             </a:r>
             <a:endParaRPr lang="pt-BR" dirty="0"/>
           </a:p>
@@ -4908,11 +4847,7 @@
           <a:p>
             <a:r>
               <a:rPr lang="pt-BR" dirty="0"/>
-              <a:t>Cenário</a:t>
-            </a:r>
-            <a:r>
-              <a:rPr lang="pt-BR" dirty="0"/>
-              <a:t>: </a:t>
+              <a:t>Cenário: </a:t>
             </a:r>
             <a:r>
               <a:rPr lang="pt-BR" dirty="0" smtClean="0"/>
@@ -5242,7 +5177,7 @@
           <p:cNvPr id="11" name="Retângulo de cantos arredondados 10">
             <a:extLst>
               <a:ext uri="{FF2B5EF4-FFF2-40B4-BE49-F238E27FC236}">
-                <a16:creationId xmlns:lc="http://schemas.openxmlformats.org/drawingml/2006/lockedCanvas" xmlns:a16="http://schemas.microsoft.com/office/drawing/2014/main" xmlns="" id="{67FC9C97-6BBA-4BFC-A5E1-2436DE02BBE2}"/>
+                <a16:creationId xmlns="" xmlns:a16="http://schemas.microsoft.com/office/drawing/2014/main" xmlns:lc="http://schemas.openxmlformats.org/drawingml/2006/lockedCanvas" id="{67FC9C97-6BBA-4BFC-A5E1-2436DE02BBE2}"/>
               </a:ext>
             </a:extLst>
           </p:cNvPr>
@@ -5400,11 +5335,7 @@
             <a:pPr algn="ctr"/>
             <a:r>
               <a:rPr lang="pt-BR" b="1" dirty="0" smtClean="0"/>
-              <a:t>Tratar</a:t>
-            </a:r>
-            <a:r>
-              <a:rPr lang="pt-BR" b="1" dirty="0" smtClean="0"/>
-              <a:t> devolução da compra.</a:t>
+              <a:t>Tratar devolução da compra.</a:t>
             </a:r>
             <a:endParaRPr lang="pt-BR" dirty="0"/>
           </a:p>
@@ -5444,11 +5375,7 @@
           <a:p>
             <a:r>
               <a:rPr lang="pt-BR" dirty="0"/>
-              <a:t>Cenário</a:t>
-            </a:r>
-            <a:r>
-              <a:rPr lang="pt-BR" dirty="0"/>
-              <a:t>: </a:t>
+              <a:t>Cenário: </a:t>
             </a:r>
             <a:r>
               <a:rPr lang="pt-BR" dirty="0" smtClean="0"/>
@@ -5666,7 +5593,7 @@
             <a:pPr algn="ctr"/>
             <a:r>
               <a:rPr lang="pt-BR" dirty="0" smtClean="0"/>
-              <a:t>Loja/Franquia</a:t>
+              <a:t>Cliente</a:t>
             </a:r>
             <a:endParaRPr lang="pt-BR" dirty="0"/>
           </a:p>
@@ -5778,7 +5705,7 @@
           <p:cNvPr id="11" name="Retângulo de cantos arredondados 10">
             <a:extLst>
               <a:ext uri="{FF2B5EF4-FFF2-40B4-BE49-F238E27FC236}">
-                <a16:creationId xmlns:lc="http://schemas.openxmlformats.org/drawingml/2006/lockedCanvas" xmlns:a16="http://schemas.microsoft.com/office/drawing/2014/main" xmlns="" id="{67FC9C97-6BBA-4BFC-A5E1-2436DE02BBE2}"/>
+                <a16:creationId xmlns="" xmlns:a16="http://schemas.microsoft.com/office/drawing/2014/main" xmlns:lc="http://schemas.openxmlformats.org/drawingml/2006/lockedCanvas" id="{67FC9C97-6BBA-4BFC-A5E1-2436DE02BBE2}"/>
               </a:ext>
             </a:extLst>
           </p:cNvPr>
@@ -5980,13 +5907,8 @@
           <a:p>
             <a:r>
               <a:rPr lang="pt-BR" dirty="0"/>
-              <a:t>Cenário: </a:t>
-            </a:r>
-            <a:r>
-              <a:rPr lang="pt-BR" dirty="0"/>
-              <a:t>Realizar o cadastro </a:t>
-            </a:r>
-            <a:endParaRPr lang="pt-BR" dirty="0"/>
+              <a:t>Cenário: Realizar o cadastro </a:t>
+            </a:r>
           </a:p>
         </p:txBody>
       </p:sp>
@@ -6097,15 +6019,7 @@
                   <a:schemeClr val="tx1"/>
                 </a:solidFill>
               </a:rPr>
-              <a:t>Vendas</a:t>
-            </a:r>
-            <a:r>
-              <a:rPr lang="pt-BR" dirty="0" smtClean="0">
-                <a:solidFill>
-                  <a:schemeClr val="tx1"/>
-                </a:solidFill>
-              </a:rPr>
-              <a:t>.</a:t>
+              <a:t>Vendas.</a:t>
             </a:r>
           </a:p>
           <a:p>
@@ -6213,8 +6127,8 @@
           <a:p>
             <a:pPr algn="ctr"/>
             <a:r>
-              <a:rPr lang="pt-BR" dirty="0" smtClean="0"/>
-              <a:t>Loja/Franquia</a:t>
+              <a:rPr lang="pt-BR" dirty="0"/>
+              <a:t>Cliente</a:t>
             </a:r>
             <a:endParaRPr lang="pt-BR" dirty="0"/>
           </a:p>
@@ -6431,7 +6345,7 @@
           <p:cNvPr id="11" name="Retângulo de cantos arredondados 10">
             <a:extLst>
               <a:ext uri="{FF2B5EF4-FFF2-40B4-BE49-F238E27FC236}">
-                <a16:creationId xmlns:lc="http://schemas.openxmlformats.org/drawingml/2006/lockedCanvas" xmlns:a16="http://schemas.microsoft.com/office/drawing/2014/main" xmlns="" id="{67FC9C97-6BBA-4BFC-A5E1-2436DE02BBE2}"/>
+                <a16:creationId xmlns="" xmlns:a16="http://schemas.microsoft.com/office/drawing/2014/main" xmlns:lc="http://schemas.openxmlformats.org/drawingml/2006/lockedCanvas" id="{67FC9C97-6BBA-4BFC-A5E1-2436DE02BBE2}"/>
               </a:ext>
             </a:extLst>
           </p:cNvPr>
@@ -6633,13 +6547,8 @@
           <a:p>
             <a:r>
               <a:rPr lang="pt-BR" dirty="0"/>
-              <a:t>Cenário: </a:t>
-            </a:r>
-            <a:r>
-              <a:rPr lang="pt-BR" dirty="0"/>
-              <a:t>Solicitar o orçamento</a:t>
-            </a:r>
-            <a:endParaRPr lang="pt-BR" dirty="0"/>
+              <a:t>Cenário: Solicitar o orçamento</a:t>
+            </a:r>
           </a:p>
         </p:txBody>
       </p:sp>
@@ -6745,8 +6654,8 @@
           <a:p>
             <a:pPr algn="ctr"/>
             <a:r>
-              <a:rPr lang="pt-BR" dirty="0" smtClean="0"/>
-              <a:t>Loja/Franquia</a:t>
+              <a:rPr lang="pt-BR" dirty="0"/>
+              <a:t>Cliente</a:t>
             </a:r>
             <a:endParaRPr lang="pt-BR" dirty="0"/>
           </a:p>
@@ -6963,7 +6872,7 @@
           <p:cNvPr id="11" name="Retângulo de cantos arredondados 10">
             <a:extLst>
               <a:ext uri="{FF2B5EF4-FFF2-40B4-BE49-F238E27FC236}">
-                <a16:creationId xmlns:lc="http://schemas.openxmlformats.org/drawingml/2006/lockedCanvas" xmlns:a16="http://schemas.microsoft.com/office/drawing/2014/main" xmlns="" id="{67FC9C97-6BBA-4BFC-A5E1-2436DE02BBE2}"/>
+                <a16:creationId xmlns="" xmlns:a16="http://schemas.microsoft.com/office/drawing/2014/main" xmlns:lc="http://schemas.openxmlformats.org/drawingml/2006/lockedCanvas" id="{67FC9C97-6BBA-4BFC-A5E1-2436DE02BBE2}"/>
               </a:ext>
             </a:extLst>
           </p:cNvPr>
@@ -7125,11 +7034,7 @@
             </a:r>
             <a:r>
               <a:rPr lang="pt-BR" b="1" dirty="0" smtClean="0"/>
-              <a:t>o aceite do</a:t>
-            </a:r>
-            <a:r>
-              <a:rPr lang="pt-BR" b="1" dirty="0" smtClean="0"/>
-              <a:t> pedido.</a:t>
+              <a:t>o aceite do pedido.</a:t>
             </a:r>
             <a:endParaRPr lang="pt-BR" dirty="0"/>
           </a:p>
@@ -7169,13 +7074,8 @@
           <a:p>
             <a:r>
               <a:rPr lang="pt-BR" dirty="0"/>
-              <a:t>Cenário: </a:t>
-            </a:r>
-            <a:r>
-              <a:rPr lang="pt-BR" dirty="0"/>
-              <a:t>Fazer pedido</a:t>
-            </a:r>
-            <a:endParaRPr lang="pt-BR" dirty="0"/>
+              <a:t>Cenário: Fazer pedido</a:t>
+            </a:r>
           </a:p>
         </p:txBody>
       </p:sp>
@@ -7281,8 +7181,8 @@
           <a:p>
             <a:pPr algn="ctr"/>
             <a:r>
-              <a:rPr lang="pt-BR" dirty="0" smtClean="0"/>
-              <a:t>Loja/Franquia</a:t>
+              <a:rPr lang="pt-BR" dirty="0"/>
+              <a:t>Cliente</a:t>
             </a:r>
             <a:endParaRPr lang="pt-BR" dirty="0"/>
           </a:p>
@@ -7499,7 +7399,7 @@
           <p:cNvPr id="11" name="Retângulo de cantos arredondados 10">
             <a:extLst>
               <a:ext uri="{FF2B5EF4-FFF2-40B4-BE49-F238E27FC236}">
-                <a16:creationId xmlns:lc="http://schemas.openxmlformats.org/drawingml/2006/lockedCanvas" xmlns:a16="http://schemas.microsoft.com/office/drawing/2014/main" xmlns="" id="{67FC9C97-6BBA-4BFC-A5E1-2436DE02BBE2}"/>
+                <a16:creationId xmlns="" xmlns:a16="http://schemas.microsoft.com/office/drawing/2014/main" xmlns:lc="http://schemas.openxmlformats.org/drawingml/2006/lockedCanvas" id="{67FC9C97-6BBA-4BFC-A5E1-2436DE02BBE2}"/>
               </a:ext>
             </a:extLst>
           </p:cNvPr>
@@ -7701,11 +7601,7 @@
           <a:p>
             <a:r>
               <a:rPr lang="pt-BR" dirty="0"/>
-              <a:t>Cenário: </a:t>
-            </a:r>
-            <a:r>
-              <a:rPr lang="pt-BR" dirty="0"/>
-              <a:t>Receber </a:t>
+              <a:t>Cenário: Receber </a:t>
             </a:r>
             <a:r>
               <a:rPr lang="pt-BR" dirty="0" smtClean="0"/>
@@ -7817,8 +7713,8 @@
           <a:p>
             <a:pPr algn="ctr"/>
             <a:r>
-              <a:rPr lang="pt-BR" dirty="0" smtClean="0"/>
-              <a:t>Loja/Franquia</a:t>
+              <a:rPr lang="pt-BR" dirty="0"/>
+              <a:t>Cliente</a:t>
             </a:r>
             <a:endParaRPr lang="pt-BR" dirty="0"/>
           </a:p>
@@ -8035,7 +7931,7 @@
           <p:cNvPr id="11" name="Retângulo de cantos arredondados 10">
             <a:extLst>
               <a:ext uri="{FF2B5EF4-FFF2-40B4-BE49-F238E27FC236}">
-                <a16:creationId xmlns:lc="http://schemas.openxmlformats.org/drawingml/2006/lockedCanvas" xmlns:a16="http://schemas.microsoft.com/office/drawing/2014/main" xmlns="" id="{67FC9C97-6BBA-4BFC-A5E1-2436DE02BBE2}"/>
+                <a16:creationId xmlns="" xmlns:a16="http://schemas.microsoft.com/office/drawing/2014/main" xmlns:lc="http://schemas.openxmlformats.org/drawingml/2006/lockedCanvas" id="{67FC9C97-6BBA-4BFC-A5E1-2436DE02BBE2}"/>
               </a:ext>
             </a:extLst>
           </p:cNvPr>
@@ -8349,8 +8245,8 @@
           <a:p>
             <a:pPr algn="ctr"/>
             <a:r>
-              <a:rPr lang="pt-BR" dirty="0" smtClean="0"/>
-              <a:t>Loja/Franquia</a:t>
+              <a:rPr lang="pt-BR" dirty="0"/>
+              <a:t>Cliente</a:t>
             </a:r>
             <a:endParaRPr lang="pt-BR" dirty="0"/>
           </a:p>
@@ -8567,7 +8463,7 @@
           <p:cNvPr id="11" name="Retângulo de cantos arredondados 10">
             <a:extLst>
               <a:ext uri="{FF2B5EF4-FFF2-40B4-BE49-F238E27FC236}">
-                <a16:creationId xmlns:lc="http://schemas.openxmlformats.org/drawingml/2006/lockedCanvas" xmlns:a16="http://schemas.microsoft.com/office/drawing/2014/main" xmlns="" id="{67FC9C97-6BBA-4BFC-A5E1-2436DE02BBE2}"/>
+                <a16:creationId xmlns="" xmlns:a16="http://schemas.microsoft.com/office/drawing/2014/main" xmlns:lc="http://schemas.openxmlformats.org/drawingml/2006/lockedCanvas" id="{67FC9C97-6BBA-4BFC-A5E1-2436DE02BBE2}"/>
               </a:ext>
             </a:extLst>
           </p:cNvPr>
@@ -8729,11 +8625,7 @@
             </a:r>
             <a:r>
               <a:rPr lang="pt-BR" b="1" dirty="0" smtClean="0"/>
-              <a:t>a devolução</a:t>
-            </a:r>
-            <a:r>
-              <a:rPr lang="pt-BR" b="1" dirty="0" smtClean="0"/>
-              <a:t> do pedido.</a:t>
+              <a:t>a devolução do pedido.</a:t>
             </a:r>
             <a:endParaRPr lang="pt-BR" dirty="0"/>
           </a:p>
@@ -8777,11 +8669,7 @@
             </a:r>
             <a:r>
               <a:rPr lang="pt-BR" dirty="0" smtClean="0"/>
-              <a:t>Devolução</a:t>
-            </a:r>
-            <a:r>
-              <a:rPr lang="pt-BR" dirty="0" smtClean="0"/>
-              <a:t> do Pedido</a:t>
+              <a:t>Devolução do Pedido</a:t>
             </a:r>
             <a:endParaRPr lang="pt-BR" dirty="0"/>
           </a:p>
@@ -9002,7 +8890,7 @@
           <p:cNvPr id="11" name="Retângulo de cantos arredondados 10">
             <a:extLst>
               <a:ext uri="{FF2B5EF4-FFF2-40B4-BE49-F238E27FC236}">
-                <a16:creationId xmlns:lc="http://schemas.openxmlformats.org/drawingml/2006/lockedCanvas" xmlns:a16="http://schemas.microsoft.com/office/drawing/2014/main" xmlns="" id="{67FC9C97-6BBA-4BFC-A5E1-2436DE02BBE2}"/>
+                <a16:creationId xmlns="" xmlns:a16="http://schemas.microsoft.com/office/drawing/2014/main" xmlns:lc="http://schemas.openxmlformats.org/drawingml/2006/lockedCanvas" id="{67FC9C97-6BBA-4BFC-A5E1-2436DE02BBE2}"/>
               </a:ext>
             </a:extLst>
           </p:cNvPr>
@@ -9204,13 +9092,8 @@
           <a:p>
             <a:r>
               <a:rPr lang="pt-BR" dirty="0"/>
-              <a:t>Cenário: </a:t>
-            </a:r>
-            <a:r>
-              <a:rPr lang="pt-BR" dirty="0"/>
-              <a:t>Cadastrar o fornecedor</a:t>
-            </a:r>
-            <a:endParaRPr lang="pt-BR" dirty="0"/>
+              <a:t>Cenário: Cadastrar o fornecedor</a:t>
+            </a:r>
           </a:p>
         </p:txBody>
       </p:sp>
@@ -9534,7 +9417,7 @@
           <p:cNvPr id="11" name="Retângulo de cantos arredondados 10">
             <a:extLst>
               <a:ext uri="{FF2B5EF4-FFF2-40B4-BE49-F238E27FC236}">
-                <a16:creationId xmlns:lc="http://schemas.openxmlformats.org/drawingml/2006/lockedCanvas" xmlns:a16="http://schemas.microsoft.com/office/drawing/2014/main" xmlns="" id="{67FC9C97-6BBA-4BFC-A5E1-2436DE02BBE2}"/>
+                <a16:creationId xmlns="" xmlns:a16="http://schemas.microsoft.com/office/drawing/2014/main" xmlns:lc="http://schemas.openxmlformats.org/drawingml/2006/lockedCanvas" id="{67FC9C97-6BBA-4BFC-A5E1-2436DE02BBE2}"/>
               </a:ext>
             </a:extLst>
           </p:cNvPr>
@@ -9736,13 +9619,8 @@
           <a:p>
             <a:r>
               <a:rPr lang="pt-BR" dirty="0"/>
-              <a:t>Cenário: </a:t>
-            </a:r>
-            <a:r>
-              <a:rPr lang="pt-BR" dirty="0"/>
-              <a:t>Fornecer orçamento</a:t>
-            </a:r>
-            <a:endParaRPr lang="pt-BR" dirty="0"/>
+              <a:t>Cenário: Fornecer orçamento</a:t>
+            </a:r>
           </a:p>
         </p:txBody>
       </p:sp>

</xml_diff>

<commit_message>
Artefatos 15, 16 e 17
</commit_message>
<xml_diff>
--- a/artefatos/15-Arquitetura de Negócio para cada Cenário.pptx
+++ b/artefatos/15-Arquitetura de Negócio para cada Cenário.pptx
@@ -3138,10 +3138,9 @@
           <a:p>
             <a:pPr algn="ctr"/>
             <a:r>
-              <a:rPr lang="pt-BR" sz="3200" u="sng" dirty="0" smtClean="0"/>
+              <a:rPr lang="pt-BR" sz="3200" dirty="0" smtClean="0"/>
               <a:t>Fábrica</a:t>
             </a:r>
-            <a:endParaRPr lang="pt-BR" sz="3200" u="sng" dirty="0" smtClean="0"/>
           </a:p>
           <a:p>
             <a:pPr algn="ctr"/>
@@ -3649,7 +3648,7 @@
           <p:cNvPr id="11" name="Retângulo de cantos arredondados 10">
             <a:extLst>
               <a:ext uri="{FF2B5EF4-FFF2-40B4-BE49-F238E27FC236}">
-                <a16:creationId xmlns:lc="http://schemas.openxmlformats.org/drawingml/2006/lockedCanvas" xmlns:a16="http://schemas.microsoft.com/office/drawing/2014/main" xmlns="" id="{67FC9C97-6BBA-4BFC-A5E1-2436DE02BBE2}"/>
+                <a16:creationId xmlns="" xmlns:a16="http://schemas.microsoft.com/office/drawing/2014/main" xmlns:lc="http://schemas.openxmlformats.org/drawingml/2006/lockedCanvas" id="{67FC9C97-6BBA-4BFC-A5E1-2436DE02BBE2}"/>
               </a:ext>
             </a:extLst>
           </p:cNvPr>
@@ -4175,7 +4174,7 @@
           <p:cNvPr id="11" name="Retângulo de cantos arredondados 10">
             <a:extLst>
               <a:ext uri="{FF2B5EF4-FFF2-40B4-BE49-F238E27FC236}">
-                <a16:creationId xmlns:lc="http://schemas.openxmlformats.org/drawingml/2006/lockedCanvas" xmlns:a16="http://schemas.microsoft.com/office/drawing/2014/main" xmlns="" id="{67FC9C97-6BBA-4BFC-A5E1-2436DE02BBE2}"/>
+                <a16:creationId xmlns="" xmlns:a16="http://schemas.microsoft.com/office/drawing/2014/main" xmlns:lc="http://schemas.openxmlformats.org/drawingml/2006/lockedCanvas" id="{67FC9C97-6BBA-4BFC-A5E1-2436DE02BBE2}"/>
               </a:ext>
             </a:extLst>
           </p:cNvPr>
@@ -4701,7 +4700,7 @@
           <p:cNvPr id="11" name="Retângulo de cantos arredondados 10">
             <a:extLst>
               <a:ext uri="{FF2B5EF4-FFF2-40B4-BE49-F238E27FC236}">
-                <a16:creationId xmlns:lc="http://schemas.openxmlformats.org/drawingml/2006/lockedCanvas" xmlns:a16="http://schemas.microsoft.com/office/drawing/2014/main" xmlns="" id="{67FC9C97-6BBA-4BFC-A5E1-2436DE02BBE2}"/>
+                <a16:creationId xmlns="" xmlns:a16="http://schemas.microsoft.com/office/drawing/2014/main" xmlns:lc="http://schemas.openxmlformats.org/drawingml/2006/lockedCanvas" id="{67FC9C97-6BBA-4BFC-A5E1-2436DE02BBE2}"/>
               </a:ext>
             </a:extLst>
           </p:cNvPr>
@@ -5232,7 +5231,7 @@
           <p:cNvPr id="11" name="Retângulo de cantos arredondados 10">
             <a:extLst>
               <a:ext uri="{FF2B5EF4-FFF2-40B4-BE49-F238E27FC236}">
-                <a16:creationId xmlns:lc="http://schemas.openxmlformats.org/drawingml/2006/lockedCanvas" xmlns:a16="http://schemas.microsoft.com/office/drawing/2014/main" xmlns="" id="{67FC9C97-6BBA-4BFC-A5E1-2436DE02BBE2}"/>
+                <a16:creationId xmlns="" xmlns:a16="http://schemas.microsoft.com/office/drawing/2014/main" xmlns:lc="http://schemas.openxmlformats.org/drawingml/2006/lockedCanvas" id="{67FC9C97-6BBA-4BFC-A5E1-2436DE02BBE2}"/>
               </a:ext>
             </a:extLst>
           </p:cNvPr>
@@ -5659,7 +5658,7 @@
           <p:cNvPr id="11" name="Retângulo de cantos arredondados 10">
             <a:extLst>
               <a:ext uri="{FF2B5EF4-FFF2-40B4-BE49-F238E27FC236}">
-                <a16:creationId xmlns:lc="http://schemas.openxmlformats.org/drawingml/2006/lockedCanvas" xmlns:a16="http://schemas.microsoft.com/office/drawing/2014/main" xmlns="" id="{67FC9C97-6BBA-4BFC-A5E1-2436DE02BBE2}"/>
+                <a16:creationId xmlns="" xmlns:a16="http://schemas.microsoft.com/office/drawing/2014/main" xmlns:lc="http://schemas.openxmlformats.org/drawingml/2006/lockedCanvas" id="{67FC9C97-6BBA-4BFC-A5E1-2436DE02BBE2}"/>
               </a:ext>
             </a:extLst>
           </p:cNvPr>
@@ -6186,7 +6185,7 @@
           <p:cNvPr id="11" name="Retângulo de cantos arredondados 10">
             <a:extLst>
               <a:ext uri="{FF2B5EF4-FFF2-40B4-BE49-F238E27FC236}">
-                <a16:creationId xmlns:lc="http://schemas.openxmlformats.org/drawingml/2006/lockedCanvas" xmlns:a16="http://schemas.microsoft.com/office/drawing/2014/main" xmlns="" id="{67FC9C97-6BBA-4BFC-A5E1-2436DE02BBE2}"/>
+                <a16:creationId xmlns="" xmlns:a16="http://schemas.microsoft.com/office/drawing/2014/main" xmlns:lc="http://schemas.openxmlformats.org/drawingml/2006/lockedCanvas" id="{67FC9C97-6BBA-4BFC-A5E1-2436DE02BBE2}"/>
               </a:ext>
             </a:extLst>
           </p:cNvPr>
@@ -6718,7 +6717,7 @@
           <p:cNvPr id="11" name="Retângulo de cantos arredondados 10">
             <a:extLst>
               <a:ext uri="{FF2B5EF4-FFF2-40B4-BE49-F238E27FC236}">
-                <a16:creationId xmlns:lc="http://schemas.openxmlformats.org/drawingml/2006/lockedCanvas" xmlns:a16="http://schemas.microsoft.com/office/drawing/2014/main" xmlns="" id="{67FC9C97-6BBA-4BFC-A5E1-2436DE02BBE2}"/>
+                <a16:creationId xmlns="" xmlns:a16="http://schemas.microsoft.com/office/drawing/2014/main" xmlns:lc="http://schemas.openxmlformats.org/drawingml/2006/lockedCanvas" id="{67FC9C97-6BBA-4BFC-A5E1-2436DE02BBE2}"/>
               </a:ext>
             </a:extLst>
           </p:cNvPr>
@@ -7245,7 +7244,7 @@
           <p:cNvPr id="11" name="Retângulo de cantos arredondados 10">
             <a:extLst>
               <a:ext uri="{FF2B5EF4-FFF2-40B4-BE49-F238E27FC236}">
-                <a16:creationId xmlns:lc="http://schemas.openxmlformats.org/drawingml/2006/lockedCanvas" xmlns:a16="http://schemas.microsoft.com/office/drawing/2014/main" xmlns="" id="{67FC9C97-6BBA-4BFC-A5E1-2436DE02BBE2}"/>
+                <a16:creationId xmlns="" xmlns:a16="http://schemas.microsoft.com/office/drawing/2014/main" xmlns:lc="http://schemas.openxmlformats.org/drawingml/2006/lockedCanvas" id="{67FC9C97-6BBA-4BFC-A5E1-2436DE02BBE2}"/>
               </a:ext>
             </a:extLst>
           </p:cNvPr>

</xml_diff>